<commit_message>
modeling/cd/intermediate: add answer for the Items etc. question
</commit_message>
<xml_diff>
--- a/diagrams/modelling/modellingStructures/classDiagramsIntermediate/a-classDiagramForItemEtc.pptx
+++ b/diagrams/modelling/modellingStructures/classDiagramsIntermediate/a-classDiagramForItemEtc.pptx
@@ -304,7 +304,7 @@
           <a:p>
             <a:fld id="{A0F86979-30DA-49EE-A740-32EBA6D2B7DE}" type="datetimeFigureOut">
               <a:rPr lang="en-SG" smtClean="0"/>
-              <a:t>17/9/2018</a:t>
+              <a:t>9/10/2018</a:t>
             </a:fld>
             <a:endParaRPr lang="en-SG"/>
           </a:p>
@@ -474,7 +474,7 @@
           <a:p>
             <a:fld id="{A0F86979-30DA-49EE-A740-32EBA6D2B7DE}" type="datetimeFigureOut">
               <a:rPr lang="en-SG" smtClean="0"/>
-              <a:t>17/9/2018</a:t>
+              <a:t>9/10/2018</a:t>
             </a:fld>
             <a:endParaRPr lang="en-SG"/>
           </a:p>
@@ -654,7 +654,7 @@
           <a:p>
             <a:fld id="{A0F86979-30DA-49EE-A740-32EBA6D2B7DE}" type="datetimeFigureOut">
               <a:rPr lang="en-SG" smtClean="0"/>
-              <a:t>17/9/2018</a:t>
+              <a:t>9/10/2018</a:t>
             </a:fld>
             <a:endParaRPr lang="en-SG"/>
           </a:p>
@@ -824,7 +824,7 @@
           <a:p>
             <a:fld id="{A0F86979-30DA-49EE-A740-32EBA6D2B7DE}" type="datetimeFigureOut">
               <a:rPr lang="en-SG" smtClean="0"/>
-              <a:t>17/9/2018</a:t>
+              <a:t>9/10/2018</a:t>
             </a:fld>
             <a:endParaRPr lang="en-SG"/>
           </a:p>
@@ -1070,7 +1070,7 @@
           <a:p>
             <a:fld id="{A0F86979-30DA-49EE-A740-32EBA6D2B7DE}" type="datetimeFigureOut">
               <a:rPr lang="en-SG" smtClean="0"/>
-              <a:t>17/9/2018</a:t>
+              <a:t>9/10/2018</a:t>
             </a:fld>
             <a:endParaRPr lang="en-SG"/>
           </a:p>
@@ -1358,7 +1358,7 @@
           <a:p>
             <a:fld id="{A0F86979-30DA-49EE-A740-32EBA6D2B7DE}" type="datetimeFigureOut">
               <a:rPr lang="en-SG" smtClean="0"/>
-              <a:t>17/9/2018</a:t>
+              <a:t>9/10/2018</a:t>
             </a:fld>
             <a:endParaRPr lang="en-SG"/>
           </a:p>
@@ -1780,7 +1780,7 @@
           <a:p>
             <a:fld id="{A0F86979-30DA-49EE-A740-32EBA6D2B7DE}" type="datetimeFigureOut">
               <a:rPr lang="en-SG" smtClean="0"/>
-              <a:t>17/9/2018</a:t>
+              <a:t>9/10/2018</a:t>
             </a:fld>
             <a:endParaRPr lang="en-SG"/>
           </a:p>
@@ -1898,7 +1898,7 @@
           <a:p>
             <a:fld id="{A0F86979-30DA-49EE-A740-32EBA6D2B7DE}" type="datetimeFigureOut">
               <a:rPr lang="en-SG" smtClean="0"/>
-              <a:t>17/9/2018</a:t>
+              <a:t>9/10/2018</a:t>
             </a:fld>
             <a:endParaRPr lang="en-SG"/>
           </a:p>
@@ -1993,7 +1993,7 @@
           <a:p>
             <a:fld id="{A0F86979-30DA-49EE-A740-32EBA6D2B7DE}" type="datetimeFigureOut">
               <a:rPr lang="en-SG" smtClean="0"/>
-              <a:t>17/9/2018</a:t>
+              <a:t>9/10/2018</a:t>
             </a:fld>
             <a:endParaRPr lang="en-SG"/>
           </a:p>
@@ -2270,7 +2270,7 @@
           <a:p>
             <a:fld id="{A0F86979-30DA-49EE-A740-32EBA6D2B7DE}" type="datetimeFigureOut">
               <a:rPr lang="en-SG" smtClean="0"/>
-              <a:t>17/9/2018</a:t>
+              <a:t>9/10/2018</a:t>
             </a:fld>
             <a:endParaRPr lang="en-SG"/>
           </a:p>
@@ -2523,7 +2523,7 @@
           <a:p>
             <a:fld id="{A0F86979-30DA-49EE-A740-32EBA6D2B7DE}" type="datetimeFigureOut">
               <a:rPr lang="en-SG" smtClean="0"/>
-              <a:t>17/9/2018</a:t>
+              <a:t>9/10/2018</a:t>
             </a:fld>
             <a:endParaRPr lang="en-SG"/>
           </a:p>
@@ -2736,7 +2736,7 @@
           <a:p>
             <a:fld id="{A0F86979-30DA-49EE-A740-32EBA6D2B7DE}" type="datetimeFigureOut">
               <a:rPr lang="en-SG" smtClean="0"/>
-              <a:t>17/9/2018</a:t>
+              <a:t>9/10/2018</a:t>
             </a:fld>
             <a:endParaRPr lang="en-SG"/>
           </a:p>
@@ -3119,7 +3119,7 @@
         </p:nvSpPr>
         <p:spPr>
           <a:xfrm>
-            <a:off x="5579156" y="2564904"/>
+            <a:off x="4787068" y="401470"/>
             <a:ext cx="1258315" cy="540059"/>
           </a:xfrm>
           <a:prstGeom prst="rect">
@@ -3171,7 +3171,7 @@
         </p:nvSpPr>
         <p:spPr>
           <a:xfrm>
-            <a:off x="6868485" y="3906873"/>
+            <a:off x="6076397" y="1743439"/>
             <a:ext cx="1878080" cy="294050"/>
           </a:xfrm>
           <a:prstGeom prst="rect">
@@ -3215,7 +3215,7 @@
         </p:nvSpPr>
         <p:spPr>
           <a:xfrm rot="16200000" flipH="1" flipV="1">
-            <a:off x="5345550" y="2749091"/>
+            <a:off x="4553462" y="585657"/>
             <a:ext cx="295526" cy="171685"/>
           </a:xfrm>
           <a:prstGeom prst="triangle">
@@ -3258,7 +3258,7 @@
         </p:nvCxnSpPr>
         <p:spPr>
           <a:xfrm rot="10800000" flipV="1">
-            <a:off x="5108387" y="2834933"/>
+            <a:off x="4316299" y="671499"/>
             <a:ext cx="299084" cy="931607"/>
           </a:xfrm>
           <a:prstGeom prst="bentConnector2">
@@ -3293,7 +3293,7 @@
         </p:nvSpPr>
         <p:spPr>
           <a:xfrm>
-            <a:off x="1979712" y="5700543"/>
+            <a:off x="1187624" y="3537109"/>
             <a:ext cx="1268843" cy="312344"/>
           </a:xfrm>
           <a:prstGeom prst="rect">
@@ -3337,7 +3337,7 @@
         </p:nvSpPr>
         <p:spPr>
           <a:xfrm>
-            <a:off x="5916929" y="3778760"/>
+            <a:off x="5124841" y="1615326"/>
             <a:ext cx="275507" cy="307777"/>
           </a:xfrm>
           <a:prstGeom prst="rect">
@@ -3370,7 +3370,7 @@
         </p:nvCxnSpPr>
         <p:spPr>
           <a:xfrm rot="10800000">
-            <a:off x="5865337" y="4053898"/>
+            <a:off x="5073249" y="1890464"/>
             <a:ext cx="1003148" cy="12700"/>
           </a:xfrm>
           <a:prstGeom prst="bentConnector3">
@@ -3410,7 +3410,7 @@
         </p:nvCxnSpPr>
         <p:spPr>
           <a:xfrm rot="10800000" flipV="1">
-            <a:off x="3248556" y="5850923"/>
+            <a:off x="2456468" y="3687489"/>
             <a:ext cx="763441" cy="5791"/>
           </a:xfrm>
           <a:prstGeom prst="bentConnector3">
@@ -3447,7 +3447,7 @@
         </p:nvSpPr>
         <p:spPr>
           <a:xfrm>
-            <a:off x="4351437" y="3766541"/>
+            <a:off x="3559349" y="1603107"/>
             <a:ext cx="1513900" cy="574714"/>
           </a:xfrm>
           <a:prstGeom prst="rect">
@@ -3498,7 +3498,7 @@
         </p:nvSpPr>
         <p:spPr>
           <a:xfrm>
-            <a:off x="4283968" y="5302809"/>
+            <a:off x="3491880" y="3139375"/>
             <a:ext cx="1648839" cy="310743"/>
           </a:xfrm>
           <a:prstGeom prst="rect">
@@ -3542,7 +3542,7 @@
         </p:nvSpPr>
         <p:spPr>
           <a:xfrm rot="10800000" flipH="1" flipV="1">
-            <a:off x="4964338" y="4790748"/>
+            <a:off x="4172250" y="2627314"/>
             <a:ext cx="295526" cy="171685"/>
           </a:xfrm>
           <a:prstGeom prst="triangle">
@@ -3585,7 +3585,7 @@
         </p:nvCxnSpPr>
         <p:spPr>
           <a:xfrm rot="5400000" flipH="1" flipV="1">
-            <a:off x="4940056" y="5130765"/>
+            <a:off x="4147968" y="2967331"/>
             <a:ext cx="340376" cy="3713"/>
           </a:xfrm>
           <a:prstGeom prst="bentConnector3">
@@ -3623,7 +3623,7 @@
         </p:nvSpPr>
         <p:spPr>
           <a:xfrm>
-            <a:off x="4283968" y="5608552"/>
+            <a:off x="3491880" y="3445118"/>
             <a:ext cx="1648839" cy="484744"/>
           </a:xfrm>
           <a:prstGeom prst="rect">
@@ -3652,13 +3652,8 @@
           <a:p>
             <a:r>
               <a:rPr lang="en-US" sz="1400" dirty="0" smtClean="0"/>
-              <a:t>- </a:t>
-            </a:r>
-            <a:r>
-              <a:rPr lang="en-US" sz="1400" dirty="0" smtClean="0"/>
-              <a:t>name: String</a:t>
-            </a:r>
-            <a:endParaRPr lang="en-US" sz="1400" dirty="0" smtClean="0"/>
+              <a:t>- name: String</a:t>
+            </a:r>
           </a:p>
           <a:p>
             <a:endParaRPr lang="en-SG" sz="1400" dirty="0"/>
@@ -3673,7 +3668,7 @@
         </p:nvSpPr>
         <p:spPr>
           <a:xfrm>
-            <a:off x="4283968" y="6096490"/>
+            <a:off x="3491880" y="3933056"/>
             <a:ext cx="1648839" cy="484744"/>
           </a:xfrm>
           <a:prstGeom prst="rect">
@@ -3704,7 +3699,6 @@
               <a:rPr lang="en-US" sz="1400" dirty="0" smtClean="0"/>
               <a:t>+print()</a:t>
             </a:r>
-            <a:endParaRPr lang="en-US" sz="1400" dirty="0" smtClean="0"/>
           </a:p>
           <a:p>
             <a:r>
@@ -3723,7 +3717,7 @@
         </p:nvSpPr>
         <p:spPr>
           <a:xfrm>
-            <a:off x="4011996" y="5711141"/>
+            <a:off x="3219908" y="3547707"/>
             <a:ext cx="266061" cy="279566"/>
           </a:xfrm>
           <a:prstGeom prst="flowChartDecision">
@@ -3763,7 +3757,7 @@
         </p:nvSpPr>
         <p:spPr>
           <a:xfrm>
-            <a:off x="6868485" y="4192511"/>
+            <a:off x="6076397" y="2029077"/>
             <a:ext cx="1878080" cy="137669"/>
           </a:xfrm>
           <a:prstGeom prst="rect">
@@ -3803,7 +3797,7 @@
         </p:nvSpPr>
         <p:spPr>
           <a:xfrm>
-            <a:off x="6870384" y="4328068"/>
+            <a:off x="6078296" y="2164634"/>
             <a:ext cx="1878080" cy="821789"/>
           </a:xfrm>
           <a:prstGeom prst="rect">
@@ -3856,7 +3850,6 @@
               <a:rPr lang="en-SG" sz="1400" dirty="0" smtClean="0"/>
               <a:t>(Billable)</a:t>
             </a:r>
-            <a:endParaRPr lang="en-SG" sz="1400" dirty="0" smtClean="0"/>
           </a:p>
           <a:p>
             <a:r>
@@ -3883,7 +3876,7 @@
         </p:nvSpPr>
         <p:spPr>
           <a:xfrm>
-            <a:off x="1826819" y="4103993"/>
+            <a:off x="1034731" y="1940559"/>
             <a:ext cx="1576377" cy="540059"/>
           </a:xfrm>
           <a:prstGeom prst="rect">
@@ -3925,10 +3918,6 @@
               <a:rPr lang="en-US" sz="1400" dirty="0" smtClean="0"/>
               <a:t>&lt;&lt;enumeration&gt;&gt;</a:t>
             </a:r>
-            <a:r>
-              <a:rPr lang="en-US" sz="1400" dirty="0" smtClean="0"/>
-              <a:t/>
-            </a:r>
             <a:br>
               <a:rPr lang="en-US" sz="1400" dirty="0" smtClean="0"/>
             </a:br>
@@ -3948,7 +3937,7 @@
         </p:nvSpPr>
         <p:spPr>
           <a:xfrm>
-            <a:off x="1826818" y="4642910"/>
+            <a:off x="1034730" y="2479476"/>
             <a:ext cx="1576377" cy="344841"/>
           </a:xfrm>
           <a:prstGeom prst="rect">
@@ -4005,7 +3994,7 @@
         </p:nvCxnSpPr>
         <p:spPr>
           <a:xfrm rot="5400000" flipH="1" flipV="1">
-            <a:off x="2258174" y="5343711"/>
+            <a:off x="1466086" y="3180277"/>
             <a:ext cx="712792" cy="873"/>
           </a:xfrm>
           <a:prstGeom prst="bentConnector3">
@@ -4049,7 +4038,7 @@
         </p:nvSpPr>
         <p:spPr>
           <a:xfrm>
-            <a:off x="4351437" y="4349003"/>
+            <a:off x="3559349" y="2185569"/>
             <a:ext cx="1513900" cy="298463"/>
           </a:xfrm>
           <a:prstGeom prst="rect">
@@ -4088,7 +4077,7 @@
         </p:nvSpPr>
         <p:spPr>
           <a:xfrm>
-            <a:off x="4351437" y="4479016"/>
+            <a:off x="3559349" y="2315582"/>
             <a:ext cx="1513900" cy="298463"/>
           </a:xfrm>
           <a:prstGeom prst="rect">
@@ -4133,7 +4122,7 @@
         </p:nvCxnSpPr>
         <p:spPr>
           <a:xfrm rot="16200000" flipV="1">
-            <a:off x="6786529" y="2885877"/>
+            <a:off x="5994441" y="722443"/>
             <a:ext cx="1071939" cy="970054"/>
           </a:xfrm>
           <a:prstGeom prst="bentConnector2">
@@ -4170,7 +4159,7 @@
         </p:nvSpPr>
         <p:spPr>
           <a:xfrm>
-            <a:off x="3248555" y="5905535"/>
+            <a:off x="2456467" y="3742101"/>
             <a:ext cx="275507" cy="307777"/>
           </a:xfrm>
           <a:prstGeom prst="rect">
@@ -4200,7 +4189,7 @@
         </p:nvSpPr>
         <p:spPr>
           <a:xfrm>
-            <a:off x="1979712" y="6007095"/>
+            <a:off x="1187624" y="3843661"/>
             <a:ext cx="1268843" cy="312344"/>
           </a:xfrm>
           <a:prstGeom prst="rect">
@@ -4227,7 +4216,6 @@
           <a:bodyPr rtlCol="0" anchor="ctr"/>
           <a:lstStyle/>
           <a:p>
-            <a:pPr algn="ctr"/>
             <a:r>
               <a:rPr lang="en-US" sz="1400" dirty="0" smtClean="0"/>
               <a:t>-</a:t>
@@ -4248,7 +4236,7 @@
         </p:nvSpPr>
         <p:spPr>
           <a:xfrm>
-            <a:off x="5579152" y="3245634"/>
+            <a:off x="4787064" y="1082200"/>
             <a:ext cx="1258315" cy="347411"/>
           </a:xfrm>
           <a:prstGeom prst="rect">
@@ -4276,7 +4264,6 @@
           <a:bodyPr rtlCol="0" anchor="ctr"/>
           <a:lstStyle/>
           <a:p>
-            <a:pPr algn="ctr"/>
             <a:r>
               <a:rPr lang="en-US" sz="1400" dirty="0"/>
               <a:t>b</a:t>
@@ -4297,7 +4284,7 @@
         </p:nvSpPr>
         <p:spPr>
           <a:xfrm>
-            <a:off x="5579154" y="3066971"/>
+            <a:off x="4787066" y="903537"/>
             <a:ext cx="1258315" cy="205345"/>
           </a:xfrm>
           <a:prstGeom prst="rect">
@@ -4330,6 +4317,358 @@
           </a:p>
         </p:txBody>
       </p:sp>
+      <p:sp>
+        <p:nvSpPr>
+          <p:cNvPr id="29" name="Rectangle 28"/>
+          <p:cNvSpPr/>
+          <p:nvPr/>
+        </p:nvSpPr>
+        <p:spPr>
+          <a:xfrm>
+            <a:off x="6405786" y="5589240"/>
+            <a:ext cx="1219302" cy="294050"/>
+          </a:xfrm>
+          <a:prstGeom prst="rect">
+            <a:avLst/>
+          </a:prstGeom>
+        </p:spPr>
+        <p:style>
+          <a:lnRef idx="2">
+            <a:schemeClr val="accent5">
+              <a:shade val="50000"/>
+            </a:schemeClr>
+          </a:lnRef>
+          <a:fillRef idx="1">
+            <a:schemeClr val="accent5"/>
+          </a:fillRef>
+          <a:effectRef idx="0">
+            <a:schemeClr val="accent5"/>
+          </a:effectRef>
+          <a:fontRef idx="minor">
+            <a:schemeClr val="lt1"/>
+          </a:fontRef>
+        </p:style>
+        <p:txBody>
+          <a:bodyPr rtlCol="0" anchor="ctr"/>
+          <a:lstStyle/>
+          <a:p>
+            <a:pPr algn="ctr"/>
+            <a:r>
+              <a:rPr lang="en-US" sz="1400" u="sng" dirty="0" smtClean="0"/>
+              <a:t>:Inventory</a:t>
+            </a:r>
+            <a:endParaRPr lang="en-SG" sz="1400" u="sng" dirty="0"/>
+          </a:p>
+        </p:txBody>
+      </p:sp>
+      <p:sp>
+        <p:nvSpPr>
+          <p:cNvPr id="31" name="Rectangle 30"/>
+          <p:cNvSpPr/>
+          <p:nvPr/>
+        </p:nvSpPr>
+        <p:spPr>
+          <a:xfrm>
+            <a:off x="3876805" y="5597822"/>
+            <a:ext cx="1648839" cy="310743"/>
+          </a:xfrm>
+          <a:prstGeom prst="rect">
+            <a:avLst/>
+          </a:prstGeom>
+        </p:spPr>
+        <p:style>
+          <a:lnRef idx="2">
+            <a:schemeClr val="accent2">
+              <a:shade val="50000"/>
+            </a:schemeClr>
+          </a:lnRef>
+          <a:fillRef idx="1">
+            <a:schemeClr val="accent2"/>
+          </a:fillRef>
+          <a:effectRef idx="0">
+            <a:schemeClr val="accent2"/>
+          </a:effectRef>
+          <a:fontRef idx="minor">
+            <a:schemeClr val="lt1"/>
+          </a:fontRef>
+        </p:style>
+        <p:txBody>
+          <a:bodyPr rtlCol="0" anchor="ctr"/>
+          <a:lstStyle/>
+          <a:p>
+            <a:pPr algn="ctr"/>
+            <a:r>
+              <a:rPr lang="en-US" sz="1400" u="sng" dirty="0" smtClean="0"/>
+              <a:t>:</a:t>
+            </a:r>
+            <a:r>
+              <a:rPr lang="en-US" sz="1400" u="sng" dirty="0" err="1" smtClean="0"/>
+              <a:t>StockItem</a:t>
+            </a:r>
+            <a:endParaRPr lang="en-SG" sz="1400" u="sng" dirty="0"/>
+          </a:p>
+        </p:txBody>
+      </p:sp>
+      <p:sp>
+        <p:nvSpPr>
+          <p:cNvPr id="32" name="Rectangle 31"/>
+          <p:cNvSpPr/>
+          <p:nvPr/>
+        </p:nvSpPr>
+        <p:spPr>
+          <a:xfrm>
+            <a:off x="3876805" y="5916379"/>
+            <a:ext cx="1640807" cy="484744"/>
+          </a:xfrm>
+          <a:prstGeom prst="rect">
+            <a:avLst/>
+          </a:prstGeom>
+        </p:spPr>
+        <p:style>
+          <a:lnRef idx="2">
+            <a:schemeClr val="accent2">
+              <a:shade val="50000"/>
+            </a:schemeClr>
+          </a:lnRef>
+          <a:fillRef idx="1">
+            <a:schemeClr val="accent2"/>
+          </a:fillRef>
+          <a:effectRef idx="0">
+            <a:schemeClr val="accent2"/>
+          </a:effectRef>
+          <a:fontRef idx="minor">
+            <a:schemeClr val="lt1"/>
+          </a:fontRef>
+        </p:style>
+        <p:txBody>
+          <a:bodyPr rtlCol="0" anchor="ctr"/>
+          <a:lstStyle/>
+          <a:p>
+            <a:r>
+              <a:rPr lang="en-US" sz="1400" dirty="0"/>
+              <a:t>n</a:t>
+            </a:r>
+            <a:r>
+              <a:rPr lang="en-US" sz="1400" dirty="0" smtClean="0"/>
+              <a:t>ame = “spanner”</a:t>
+            </a:r>
+          </a:p>
+          <a:p>
+            <a:endParaRPr lang="en-SG" sz="1400" dirty="0"/>
+          </a:p>
+        </p:txBody>
+      </p:sp>
+      <p:sp>
+        <p:nvSpPr>
+          <p:cNvPr id="33" name="Rectangle 32"/>
+          <p:cNvSpPr/>
+          <p:nvPr/>
+        </p:nvSpPr>
+        <p:spPr>
+          <a:xfrm>
+            <a:off x="1603291" y="5614842"/>
+            <a:ext cx="1268843" cy="312344"/>
+          </a:xfrm>
+          <a:prstGeom prst="rect">
+            <a:avLst/>
+          </a:prstGeom>
+        </p:spPr>
+        <p:style>
+          <a:lnRef idx="2">
+            <a:schemeClr val="accent6">
+              <a:shade val="50000"/>
+            </a:schemeClr>
+          </a:lnRef>
+          <a:fillRef idx="1">
+            <a:schemeClr val="accent6"/>
+          </a:fillRef>
+          <a:effectRef idx="0">
+            <a:schemeClr val="accent6"/>
+          </a:effectRef>
+          <a:fontRef idx="minor">
+            <a:schemeClr val="lt1"/>
+          </a:fontRef>
+        </p:style>
+        <p:txBody>
+          <a:bodyPr rtlCol="0" anchor="ctr"/>
+          <a:lstStyle/>
+          <a:p>
+            <a:pPr algn="ctr"/>
+            <a:r>
+              <a:rPr lang="en-US" sz="1400" u="sng" dirty="0" smtClean="0"/>
+              <a:t>:Review</a:t>
+            </a:r>
+            <a:endParaRPr lang="en-SG" sz="1400" u="sng" dirty="0"/>
+          </a:p>
+        </p:txBody>
+      </p:sp>
+      <p:cxnSp>
+        <p:nvCxnSpPr>
+          <p:cNvPr id="34" name="Elbow Connector 33"/>
+          <p:cNvCxnSpPr>
+            <a:stCxn id="35" idx="1"/>
+            <a:endCxn id="33" idx="3"/>
+          </p:cNvCxnSpPr>
+          <p:nvPr/>
+        </p:nvCxnSpPr>
+        <p:spPr>
+          <a:xfrm rot="10800000" flipV="1">
+            <a:off x="2872135" y="5765222"/>
+            <a:ext cx="763441" cy="5791"/>
+          </a:xfrm>
+          <a:prstGeom prst="bentConnector3">
+            <a:avLst>
+              <a:gd name="adj1" fmla="val 50000"/>
+            </a:avLst>
+          </a:prstGeom>
+          <a:ln>
+            <a:tailEnd type="arrow"/>
+          </a:ln>
+        </p:spPr>
+        <p:style>
+          <a:lnRef idx="2">
+            <a:schemeClr val="accent6">
+              <a:shade val="50000"/>
+            </a:schemeClr>
+          </a:lnRef>
+          <a:fillRef idx="1">
+            <a:schemeClr val="accent6"/>
+          </a:fillRef>
+          <a:effectRef idx="0">
+            <a:schemeClr val="accent6"/>
+          </a:effectRef>
+          <a:fontRef idx="minor">
+            <a:schemeClr val="lt1"/>
+          </a:fontRef>
+        </p:style>
+      </p:cxnSp>
+      <p:sp>
+        <p:nvSpPr>
+          <p:cNvPr id="35" name="Flowchart: Decision 34"/>
+          <p:cNvSpPr/>
+          <p:nvPr/>
+        </p:nvSpPr>
+        <p:spPr>
+          <a:xfrm>
+            <a:off x="3635575" y="5625440"/>
+            <a:ext cx="266061" cy="279566"/>
+          </a:xfrm>
+          <a:prstGeom prst="flowChartDecision">
+            <a:avLst/>
+          </a:prstGeom>
+        </p:spPr>
+        <p:style>
+          <a:lnRef idx="2">
+            <a:schemeClr val="accent6">
+              <a:shade val="50000"/>
+            </a:schemeClr>
+          </a:lnRef>
+          <a:fillRef idx="1">
+            <a:schemeClr val="accent6"/>
+          </a:fillRef>
+          <a:effectRef idx="0">
+            <a:schemeClr val="accent6"/>
+          </a:effectRef>
+          <a:fontRef idx="minor">
+            <a:schemeClr val="lt1"/>
+          </a:fontRef>
+        </p:style>
+        <p:txBody>
+          <a:bodyPr rtlCol="0" anchor="ctr"/>
+          <a:lstStyle/>
+          <a:p>
+            <a:pPr algn="ctr"/>
+            <a:endParaRPr lang="en-US" sz="1400"/>
+          </a:p>
+        </p:txBody>
+      </p:sp>
+      <p:sp>
+        <p:nvSpPr>
+          <p:cNvPr id="38" name="Rectangle 37"/>
+          <p:cNvSpPr/>
+          <p:nvPr/>
+        </p:nvSpPr>
+        <p:spPr>
+          <a:xfrm>
+            <a:off x="1603291" y="5921394"/>
+            <a:ext cx="1268843" cy="312344"/>
+          </a:xfrm>
+          <a:prstGeom prst="rect">
+            <a:avLst/>
+          </a:prstGeom>
+        </p:spPr>
+        <p:style>
+          <a:lnRef idx="2">
+            <a:schemeClr val="accent6">
+              <a:shade val="50000"/>
+            </a:schemeClr>
+          </a:lnRef>
+          <a:fillRef idx="1">
+            <a:schemeClr val="accent6"/>
+          </a:fillRef>
+          <a:effectRef idx="0">
+            <a:schemeClr val="accent6"/>
+          </a:effectRef>
+          <a:fontRef idx="minor">
+            <a:schemeClr val="lt1"/>
+          </a:fontRef>
+        </p:style>
+        <p:txBody>
+          <a:bodyPr rtlCol="0" anchor="ctr"/>
+          <a:lstStyle/>
+          <a:p>
+            <a:r>
+              <a:rPr lang="en-US" sz="1400" dirty="0"/>
+              <a:t>r</a:t>
+            </a:r>
+            <a:r>
+              <a:rPr lang="en-US" sz="1400" dirty="0" smtClean="0"/>
+              <a:t>ating=POOR</a:t>
+            </a:r>
+            <a:endParaRPr lang="en-SG" sz="1400" dirty="0"/>
+          </a:p>
+        </p:txBody>
+      </p:sp>
+      <p:cxnSp>
+        <p:nvCxnSpPr>
+          <p:cNvPr id="39" name="Elbow Connector 38"/>
+          <p:cNvCxnSpPr>
+            <a:stCxn id="29" idx="1"/>
+            <a:endCxn id="31" idx="3"/>
+          </p:cNvCxnSpPr>
+          <p:nvPr/>
+        </p:nvCxnSpPr>
+        <p:spPr>
+          <a:xfrm rot="10800000" flipV="1">
+            <a:off x="5525644" y="5736264"/>
+            <a:ext cx="880142" cy="16929"/>
+          </a:xfrm>
+          <a:prstGeom prst="bentConnector3">
+            <a:avLst>
+              <a:gd name="adj1" fmla="val 50000"/>
+            </a:avLst>
+          </a:prstGeom>
+          <a:ln>
+            <a:tailEnd type="arrow"/>
+          </a:ln>
+        </p:spPr>
+        <p:style>
+          <a:lnRef idx="2">
+            <a:schemeClr val="accent5">
+              <a:shade val="50000"/>
+            </a:schemeClr>
+          </a:lnRef>
+          <a:fillRef idx="1">
+            <a:schemeClr val="accent5"/>
+          </a:fillRef>
+          <a:effectRef idx="0">
+            <a:schemeClr val="accent5"/>
+          </a:effectRef>
+          <a:fontRef idx="minor">
+            <a:schemeClr val="lt1"/>
+          </a:fontRef>
+        </p:style>
+      </p:cxnSp>
     </p:spTree>
     <p:extLst>
       <p:ext uri="{BB962C8B-B14F-4D97-AF65-F5344CB8AC3E}">

</xml_diff>